<commit_message>
updated biopsykit overview figure
</commit_message>
<xml_diff>
--- a/paper/img/biopsykit_overview_figure.pptx
+++ b/paper/img/biopsykit_overview_figure.pptx
@@ -104,6 +104,11 @@
       </a:defRPr>
     </a:lvl9pPr>
   </p:defaultTextStyle>
+  <p:extLst>
+    <p:ext uri="{EFAFB233-063F-42B5-8137-9DF3F51BA10A}">
+      <p15:sldGuideLst xmlns:p15="http://schemas.microsoft.com/office/powerpoint/2012/main"/>
+    </p:ext>
+  </p:extLst>
 </p:presentation>
 </file>
 
@@ -238,7 +243,7 @@
           <a:p>
             <a:fld id="{C1D125CB-8DCC-074C-B65D-BDD387DAFE24}" type="datetimeFigureOut">
               <a:rPr lang="en-DE" smtClean="0"/>
-              <a:t>31.08.21</a:t>
+              <a:t>30.09.21</a:t>
             </a:fld>
             <a:endParaRPr lang="en-DE"/>
           </a:p>
@@ -408,7 +413,7 @@
           <a:p>
             <a:fld id="{C1D125CB-8DCC-074C-B65D-BDD387DAFE24}" type="datetimeFigureOut">
               <a:rPr lang="en-DE" smtClean="0"/>
-              <a:t>31.08.21</a:t>
+              <a:t>30.09.21</a:t>
             </a:fld>
             <a:endParaRPr lang="en-DE"/>
           </a:p>
@@ -588,7 +593,7 @@
           <a:p>
             <a:fld id="{C1D125CB-8DCC-074C-B65D-BDD387DAFE24}" type="datetimeFigureOut">
               <a:rPr lang="en-DE" smtClean="0"/>
-              <a:t>31.08.21</a:t>
+              <a:t>30.09.21</a:t>
             </a:fld>
             <a:endParaRPr lang="en-DE"/>
           </a:p>
@@ -696,14 +701,14 @@
           </a:ln>
           <a:extLst>
             <a:ext uri="{909E8E84-426E-40dd-AFC4-6F175D3DCCD1}">
-              <a14:hiddenFill xmlns="" xmlns:a14="http://schemas.microsoft.com/office/drawing/2010/main">
+              <a14:hiddenFill xmlns:a14="http://schemas.microsoft.com/office/drawing/2010/main" xmlns="">
                 <a:solidFill>
                   <a:srgbClr val="FFFFFF"/>
                 </a:solidFill>
               </a14:hiddenFill>
             </a:ext>
             <a:ext uri="{91240B29-F687-4f45-9708-019B960494DF}">
-              <a14:hiddenLine xmlns="" xmlns:a14="http://schemas.microsoft.com/office/drawing/2010/main" w="9525">
+              <a14:hiddenLine xmlns:a14="http://schemas.microsoft.com/office/drawing/2010/main" xmlns="" w="9525">
                 <a:solidFill>
                   <a:srgbClr val="000000"/>
                 </a:solidFill>
@@ -713,7 +718,7 @@
               </a14:hiddenLine>
             </a:ext>
             <a:ext uri="{FAA26D3D-D897-4be2-8F04-BA451C77F1D7}">
-              <ma14:placeholderFlag xmlns="" xmlns:ma14="http://schemas.microsoft.com/office/mac/drawingml/2011/main" val="1"/>
+              <ma14:placeholderFlag xmlns:ma14="http://schemas.microsoft.com/office/mac/drawingml/2011/main" xmlns="" val="1"/>
             </a:ext>
           </a:extLst>
         </p:spPr>
@@ -919,7 +924,7 @@
           <a:p>
             <a:fld id="{C1D125CB-8DCC-074C-B65D-BDD387DAFE24}" type="datetimeFigureOut">
               <a:rPr lang="en-DE" smtClean="0"/>
-              <a:t>31.08.21</a:t>
+              <a:t>30.09.21</a:t>
             </a:fld>
             <a:endParaRPr lang="en-DE"/>
           </a:p>
@@ -1163,7 +1168,7 @@
           <a:p>
             <a:fld id="{C1D125CB-8DCC-074C-B65D-BDD387DAFE24}" type="datetimeFigureOut">
               <a:rPr lang="en-DE" smtClean="0"/>
-              <a:t>31.08.21</a:t>
+              <a:t>30.09.21</a:t>
             </a:fld>
             <a:endParaRPr lang="en-DE"/>
           </a:p>
@@ -1395,7 +1400,7 @@
           <a:p>
             <a:fld id="{C1D125CB-8DCC-074C-B65D-BDD387DAFE24}" type="datetimeFigureOut">
               <a:rPr lang="en-DE" smtClean="0"/>
-              <a:t>31.08.21</a:t>
+              <a:t>30.09.21</a:t>
             </a:fld>
             <a:endParaRPr lang="en-DE"/>
           </a:p>
@@ -1762,7 +1767,7 @@
           <a:p>
             <a:fld id="{C1D125CB-8DCC-074C-B65D-BDD387DAFE24}" type="datetimeFigureOut">
               <a:rPr lang="en-DE" smtClean="0"/>
-              <a:t>31.08.21</a:t>
+              <a:t>30.09.21</a:t>
             </a:fld>
             <a:endParaRPr lang="en-DE"/>
           </a:p>
@@ -1880,7 +1885,7 @@
           <a:p>
             <a:fld id="{C1D125CB-8DCC-074C-B65D-BDD387DAFE24}" type="datetimeFigureOut">
               <a:rPr lang="en-DE" smtClean="0"/>
-              <a:t>31.08.21</a:t>
+              <a:t>30.09.21</a:t>
             </a:fld>
             <a:endParaRPr lang="en-DE"/>
           </a:p>
@@ -1975,7 +1980,7 @@
           <a:p>
             <a:fld id="{C1D125CB-8DCC-074C-B65D-BDD387DAFE24}" type="datetimeFigureOut">
               <a:rPr lang="en-DE" smtClean="0"/>
-              <a:t>31.08.21</a:t>
+              <a:t>30.09.21</a:t>
             </a:fld>
             <a:endParaRPr lang="en-DE"/>
           </a:p>
@@ -2252,7 +2257,7 @@
           <a:p>
             <a:fld id="{C1D125CB-8DCC-074C-B65D-BDD387DAFE24}" type="datetimeFigureOut">
               <a:rPr lang="en-DE" smtClean="0"/>
-              <a:t>31.08.21</a:t>
+              <a:t>30.09.21</a:t>
             </a:fld>
             <a:endParaRPr lang="en-DE"/>
           </a:p>
@@ -2509,7 +2514,7 @@
           <a:p>
             <a:fld id="{C1D125CB-8DCC-074C-B65D-BDD387DAFE24}" type="datetimeFigureOut">
               <a:rPr lang="en-DE" smtClean="0"/>
-              <a:t>31.08.21</a:t>
+              <a:t>30.09.21</a:t>
             </a:fld>
             <a:endParaRPr lang="en-DE"/>
           </a:p>
@@ -2722,7 +2727,7 @@
           <a:p>
             <a:fld id="{C1D125CB-8DCC-074C-B65D-BDD387DAFE24}" type="datetimeFigureOut">
               <a:rPr lang="en-DE" smtClean="0"/>
-              <a:t>31.08.21</a:t>
+              <a:t>30.09.21</a:t>
             </a:fld>
             <a:endParaRPr lang="en-DE"/>
           </a:p>
@@ -5151,7 +5156,7 @@
                   <a:ea typeface="ＭＳ Ｐゴシック" charset="0"/>
                   <a:cs typeface="Arial" panose="020B0604020202020204" pitchFamily="34" charset="0"/>
                 </a:rPr>
-                <a:t>Questionnaire Score Computation</a:t>
+                <a:t>Data Handling &amp; Manipulation</a:t>
               </a:r>
             </a:p>
             <a:p>
@@ -5166,7 +5171,7 @@
                   <a:ea typeface="ＭＳ Ｐゴシック" charset="0"/>
                   <a:cs typeface="Arial" panose="020B0604020202020204" pitchFamily="34" charset="0"/>
                 </a:rPr>
-                <a:t>Data Handling &amp; Manipulation</a:t>
+                <a:t>Questionnaire Score Computation</a:t>
               </a:r>
             </a:p>
             <a:p>
@@ -5312,9 +5317,9 @@
         <p:grpSpPr>
           <a:xfrm>
             <a:off x="12301009" y="2079484"/>
-            <a:ext cx="4596064" cy="11427999"/>
+            <a:ext cx="4596064" cy="10994865"/>
             <a:chOff x="12301009" y="2136949"/>
-            <a:chExt cx="4596064" cy="11427999"/>
+            <a:chExt cx="4596064" cy="10994865"/>
           </a:xfrm>
         </p:grpSpPr>
         <p:sp>
@@ -5395,7 +5400,7 @@
           </p:nvSpPr>
           <p:spPr>
             <a:xfrm>
-              <a:off x="13031743" y="6204372"/>
+              <a:off x="13031743" y="5771238"/>
               <a:ext cx="3855600" cy="1956247"/>
             </a:xfrm>
             <a:prstGeom prst="roundRect">
@@ -5483,7 +5488,7 @@
           </p:nvSpPr>
           <p:spPr>
             <a:xfrm>
-              <a:off x="13031809" y="6204373"/>
+              <a:off x="13031809" y="5771239"/>
               <a:ext cx="3855600" cy="596293"/>
             </a:xfrm>
             <a:prstGeom prst="roundRect">
@@ -5547,7 +5552,7 @@
           </p:nvSpPr>
           <p:spPr>
             <a:xfrm>
-              <a:off x="13031743" y="10124552"/>
+              <a:off x="13031743" y="9691418"/>
               <a:ext cx="3865330" cy="3440396"/>
             </a:xfrm>
             <a:prstGeom prst="roundRect">
@@ -5689,7 +5694,7 @@
           </p:nvSpPr>
           <p:spPr>
             <a:xfrm>
-              <a:off x="13031809" y="10124553"/>
+              <a:off x="13031809" y="9691419"/>
               <a:ext cx="3855600" cy="596293"/>
             </a:xfrm>
             <a:prstGeom prst="roundRect">
@@ -5718,7 +5723,7 @@
                 <a:defRPr/>
               </a:pPr>
               <a:r>
-                <a:rPr lang="en-US" sz="3200" b="1" dirty="0" err="1">
+                <a:rPr lang="en-US" sz="3200" b="1" dirty="0">
                   <a:solidFill>
                     <a:srgbClr val="FFFFFF"/>
                   </a:solidFill>
@@ -5726,7 +5731,7 @@
                   <a:ea typeface="ＭＳ Ｐゴシック" charset="0"/>
                   <a:cs typeface="Courier New" panose="02070309020205020404" pitchFamily="49" charset="0"/>
                 </a:rPr>
-                <a:t>data_handling</a:t>
+                <a:t>utils</a:t>
               </a:r>
               <a:endParaRPr lang="en-US" sz="2400" b="1" dirty="0">
                 <a:solidFill>
@@ -5810,8 +5815,8 @@
           </p:nvCxnSpPr>
           <p:spPr>
             <a:xfrm rot="16200000" flipH="1">
-              <a:off x="11117464" y="4588175"/>
-              <a:ext cx="3359146" cy="469543"/>
+              <a:off x="11334031" y="4371608"/>
+              <a:ext cx="2926012" cy="469543"/>
             </a:xfrm>
             <a:prstGeom prst="bentConnector2">
               <a:avLst/>
@@ -5856,8 +5861,8 @@
           </p:nvCxnSpPr>
           <p:spPr>
             <a:xfrm rot="16200000" flipH="1">
-              <a:off x="9157374" y="6548265"/>
-              <a:ext cx="7279326" cy="469543"/>
+              <a:off x="9373941" y="6331698"/>
+              <a:ext cx="6846192" cy="469543"/>
             </a:xfrm>
             <a:prstGeom prst="bentConnector2">
               <a:avLst/>
@@ -5899,7 +5904,7 @@
           <p:spPr>
             <a:xfrm>
               <a:off x="13031743" y="3327865"/>
-              <a:ext cx="3865330" cy="2683154"/>
+              <a:ext cx="3865330" cy="2296421"/>
             </a:xfrm>
             <a:prstGeom prst="roundRect">
               <a:avLst>
@@ -5983,21 +5988,6 @@
                   <a:cs typeface="Arial" panose="020B0604020202020204" pitchFamily="34" charset="0"/>
                 </a:rPr>
                 <a:t>CAR</a:t>
-              </a:r>
-            </a:p>
-            <a:p>
-              <a:pPr marL="342900" indent="-342900" fontAlgn="base">
-                <a:buFont typeface="Arial" panose="020B0604020202020204" pitchFamily="34" charset="0"/>
-                <a:buChar char="•"/>
-                <a:defRPr/>
-              </a:pPr>
-              <a:r>
-                <a:rPr lang="en-US" sz="2400" dirty="0">
-                  <a:latin typeface="Arial" panose="020B0604020202020204" pitchFamily="34" charset="0"/>
-                  <a:ea typeface="ＭＳ Ｐゴシック" charset="0"/>
-                  <a:cs typeface="Arial" panose="020B0604020202020204" pitchFamily="34" charset="0"/>
-                </a:rPr>
-                <a:t>CFT</a:t>
               </a:r>
             </a:p>
             <a:p>
@@ -6141,7 +6131,7 @@
           </p:nvSpPr>
           <p:spPr>
             <a:xfrm>
-              <a:off x="13031743" y="8327007"/>
+              <a:off x="13031743" y="7893873"/>
               <a:ext cx="3855600" cy="1652197"/>
             </a:xfrm>
             <a:prstGeom prst="roundRect">
@@ -6214,7 +6204,7 @@
           </p:nvSpPr>
           <p:spPr>
             <a:xfrm>
-              <a:off x="13031809" y="8327008"/>
+              <a:off x="13031809" y="7893874"/>
               <a:ext cx="3855600" cy="596293"/>
             </a:xfrm>
             <a:prstGeom prst="roundRect">

</xml_diff>